<commit_message>
Update presentation slide and hospitals in district 12 (after presentation)
</commit_message>
<xml_diff>
--- a/Hospital Finder.pptx
+++ b/Hospital Finder.pptx
@@ -5152,7 +5152,6 @@
               <a:rPr lang="en-US" sz="2500" dirty="0" smtClean="0"/>
               <a:t>”</a:t>
             </a:r>
-            <a:endParaRPr lang="en-US" sz="2500" dirty="0" smtClean="0"/>
           </a:p>
         </p:txBody>
       </p:sp>
@@ -5605,11 +5604,7 @@
             </a:r>
             <a:r>
               <a:rPr lang="en-US" sz="2500" b="1" dirty="0" smtClean="0"/>
-              <a:t> </a:t>
-            </a:r>
-            <a:r>
-              <a:rPr lang="en-US" sz="2500" b="1" dirty="0" smtClean="0"/>
-              <a:t>1</a:t>
+              <a:t> 1</a:t>
             </a:r>
             <a:r>
               <a:rPr lang="en-US" sz="2500" dirty="0" smtClean="0"/>
@@ -5811,7 +5806,6 @@
               <a:rPr lang="en-US" sz="2500" dirty="0" smtClean="0"/>
               <a:t>”</a:t>
             </a:r>
-            <a:endParaRPr lang="en-US" sz="2500" dirty="0" smtClean="0"/>
           </a:p>
         </p:txBody>
       </p:sp>
@@ -6258,7 +6252,6 @@
               <a:rPr lang="en-US" sz="2500" dirty="0" smtClean="0"/>
               <a:t>”</a:t>
             </a:r>
-            <a:endParaRPr lang="en-US" sz="2500" dirty="0" smtClean="0"/>
           </a:p>
           <a:p>
             <a:pPr lvl="1" algn="just">
@@ -6407,7 +6400,6 @@
               <a:rPr lang="en-US" sz="2500" dirty="0" smtClean="0"/>
               <a:t>”.</a:t>
             </a:r>
-            <a:endParaRPr lang="en-US" sz="2500" dirty="0" smtClean="0"/>
           </a:p>
         </p:txBody>
       </p:sp>
@@ -8621,21 +8613,12 @@
               <a:buAutoNum type="arabicPeriod"/>
             </a:pPr>
             <a:r>
+              <a:rPr lang="en-US" sz="3000" smtClean="0"/>
+              <a:t>Manage </a:t>
+            </a:r>
+            <a:r>
               <a:rPr lang="en-US" sz="3000" dirty="0" smtClean="0"/>
-              <a:t>Import list of hospitals in District 12 and using search options to search</a:t>
-            </a:r>
-          </a:p>
-          <a:p>
-            <a:pPr marL="491490" indent="-457200">
-              <a:spcBef>
-                <a:spcPts val="1200"/>
-              </a:spcBef>
-              <a:buFont typeface="+mj-lt"/>
-              <a:buAutoNum type="arabicPeriod"/>
-            </a:pPr>
-            <a:r>
-              <a:rPr lang="en-US" sz="3000" dirty="0" smtClean="0"/>
-              <a:t>Manage information of hospitals</a:t>
+              <a:t>information of hospitals</a:t>
             </a:r>
           </a:p>
           <a:p>

</xml_diff>